<commit_message>
Finished all BMP screens.
Signed-off-by: Omer Wexler <omerwexler14@gmail.com>
</commit_message>
<xml_diff>
--- a/JPGs/Presentation1.pptx
+++ b/JPGs/Presentation1.pptx
@@ -417,7 +417,7 @@
           <a:p>
             <a:fld id="{3201D0F4-FCAE-4EF6-A237-A60763AE8455}" type="datetimeFigureOut">
               <a:rPr lang="en-US" smtClean="0"/>
-              <a:t>5/19/2019</a:t>
+              <a:t>5/20/2019</a:t>
             </a:fld>
             <a:endParaRPr lang="en-US"/>
           </a:p>
@@ -615,7 +615,7 @@
           <a:p>
             <a:fld id="{3201D0F4-FCAE-4EF6-A237-A60763AE8455}" type="datetimeFigureOut">
               <a:rPr lang="en-US" smtClean="0"/>
-              <a:t>5/19/2019</a:t>
+              <a:t>5/20/2019</a:t>
             </a:fld>
             <a:endParaRPr lang="en-US"/>
           </a:p>
@@ -823,7 +823,7 @@
           <a:p>
             <a:fld id="{3201D0F4-FCAE-4EF6-A237-A60763AE8455}" type="datetimeFigureOut">
               <a:rPr lang="en-US" smtClean="0"/>
-              <a:t>5/19/2019</a:t>
+              <a:t>5/20/2019</a:t>
             </a:fld>
             <a:endParaRPr lang="en-US"/>
           </a:p>
@@ -1021,7 +1021,7 @@
           <a:p>
             <a:fld id="{3201D0F4-FCAE-4EF6-A237-A60763AE8455}" type="datetimeFigureOut">
               <a:rPr lang="en-US" smtClean="0"/>
-              <a:t>5/19/2019</a:t>
+              <a:t>5/20/2019</a:t>
             </a:fld>
             <a:endParaRPr lang="en-US"/>
           </a:p>
@@ -1296,7 +1296,7 @@
           <a:p>
             <a:fld id="{3201D0F4-FCAE-4EF6-A237-A60763AE8455}" type="datetimeFigureOut">
               <a:rPr lang="en-US" smtClean="0"/>
-              <a:t>5/19/2019</a:t>
+              <a:t>5/20/2019</a:t>
             </a:fld>
             <a:endParaRPr lang="en-US"/>
           </a:p>
@@ -1561,7 +1561,7 @@
           <a:p>
             <a:fld id="{3201D0F4-FCAE-4EF6-A237-A60763AE8455}" type="datetimeFigureOut">
               <a:rPr lang="en-US" smtClean="0"/>
-              <a:t>5/19/2019</a:t>
+              <a:t>5/20/2019</a:t>
             </a:fld>
             <a:endParaRPr lang="en-US"/>
           </a:p>
@@ -1973,7 +1973,7 @@
           <a:p>
             <a:fld id="{3201D0F4-FCAE-4EF6-A237-A60763AE8455}" type="datetimeFigureOut">
               <a:rPr lang="en-US" smtClean="0"/>
-              <a:t>5/19/2019</a:t>
+              <a:t>5/20/2019</a:t>
             </a:fld>
             <a:endParaRPr lang="en-US"/>
           </a:p>
@@ -2114,7 +2114,7 @@
           <a:p>
             <a:fld id="{3201D0F4-FCAE-4EF6-A237-A60763AE8455}" type="datetimeFigureOut">
               <a:rPr lang="en-US" smtClean="0"/>
-              <a:t>5/19/2019</a:t>
+              <a:t>5/20/2019</a:t>
             </a:fld>
             <a:endParaRPr lang="en-US"/>
           </a:p>
@@ -2227,7 +2227,7 @@
           <a:p>
             <a:fld id="{3201D0F4-FCAE-4EF6-A237-A60763AE8455}" type="datetimeFigureOut">
               <a:rPr lang="en-US" smtClean="0"/>
-              <a:t>5/19/2019</a:t>
+              <a:t>5/20/2019</a:t>
             </a:fld>
             <a:endParaRPr lang="en-US"/>
           </a:p>
@@ -2538,7 +2538,7 @@
           <a:p>
             <a:fld id="{3201D0F4-FCAE-4EF6-A237-A60763AE8455}" type="datetimeFigureOut">
               <a:rPr lang="en-US" smtClean="0"/>
-              <a:t>5/19/2019</a:t>
+              <a:t>5/20/2019</a:t>
             </a:fld>
             <a:endParaRPr lang="en-US"/>
           </a:p>
@@ -2826,7 +2826,7 @@
           <a:p>
             <a:fld id="{3201D0F4-FCAE-4EF6-A237-A60763AE8455}" type="datetimeFigureOut">
               <a:rPr lang="en-US" smtClean="0"/>
-              <a:t>5/19/2019</a:t>
+              <a:t>5/20/2019</a:t>
             </a:fld>
             <a:endParaRPr lang="en-US"/>
           </a:p>
@@ -3076,7 +3076,7 @@
           <a:p>
             <a:fld id="{3201D0F4-FCAE-4EF6-A237-A60763AE8455}" type="datetimeFigureOut">
               <a:rPr lang="en-US" smtClean="0"/>
-              <a:t>5/19/2019</a:t>
+              <a:t>5/20/2019</a:t>
             </a:fld>
             <a:endParaRPr lang="en-US"/>
           </a:p>
@@ -21323,7 +21323,7 @@
         <p:spPr>
           <a:xfrm>
             <a:off x="-60960" y="0"/>
-            <a:ext cx="12313920" cy="1323439"/>
+            <a:ext cx="12313920" cy="1938992"/>
           </a:xfrm>
           <a:prstGeom prst="rect">
             <a:avLst/>
@@ -21344,6 +21344,35 @@
                 <a:latin typeface="Impact" panose="020B0806030902050204" pitchFamily="34" charset="0"/>
               </a:rPr>
               <a:t>A B C D E F G H I J K L M N O P Q R S T U V W X Y Z</a:t>
+            </a:r>
+          </a:p>
+          <a:p>
+            <a:r>
+              <a:rPr lang="en-US" sz="4000" spc="300" dirty="0">
+                <a:solidFill>
+                  <a:srgbClr val="2EEE53"/>
+                </a:solidFill>
+                <a:latin typeface="Impact" panose="020B0806030902050204" pitchFamily="34" charset="0"/>
+              </a:rPr>
+              <a:t>a b c d e f g h </a:t>
+            </a:r>
+            <a:r>
+              <a:rPr lang="en-US" sz="4000" spc="300" dirty="0" err="1">
+                <a:solidFill>
+                  <a:srgbClr val="2EEE53"/>
+                </a:solidFill>
+                <a:latin typeface="Impact" panose="020B0806030902050204" pitchFamily="34" charset="0"/>
+              </a:rPr>
+              <a:t>i</a:t>
+            </a:r>
+            <a:r>
+              <a:rPr lang="en-US" sz="4000" spc="300" dirty="0">
+                <a:solidFill>
+                  <a:srgbClr val="2EEE53"/>
+                </a:solidFill>
+                <a:latin typeface="Impact" panose="020B0806030902050204" pitchFamily="34" charset="0"/>
+              </a:rPr>
+              <a:t> j k l m n o p q r s t u v w x y z</a:t>
             </a:r>
           </a:p>
           <a:p>

</xml_diff>